<commit_message>
Agrego video, actualizo leeme.txt
</commit_message>
<xml_diff>
--- a/Distribución de los Prestadores de Salud en Colombia.pptx
+++ b/Distribución de los Prestadores de Salud en Colombia.pptx
@@ -6131,7 +6131,7 @@
         </p:spPr>
         <p:txBody>
           <a:bodyPr>
-            <a:normAutofit fontScale="90000"/>
+            <a:normAutofit/>
           </a:bodyPr>
           <a:lstStyle/>
           <a:p>
@@ -6142,7 +6142,7 @@
                 <a:ea typeface="Aptos" panose="020B0004020202020204" pitchFamily="34" charset="0"/>
                 <a:cs typeface="Times New Roman" panose="02020603050405020304" pitchFamily="18" charset="0"/>
               </a:rPr>
-              <a:t>La Distribución de los Prestadores de Salud en Colombia: Desafíos y Oportunidades</a:t>
+              <a:t>La Distribución de los Prestadores de Salud en Colombia</a:t>
             </a:r>
             <a:br>
               <a:rPr lang="es-CO" kern="100" dirty="0">
@@ -8345,7 +8345,7 @@
         </p:blipFill>
         <p:spPr>
           <a:xfrm>
-            <a:off x="1912551" y="2130457"/>
+            <a:off x="1455351" y="2052819"/>
             <a:ext cx="6491053" cy="4595567"/>
           </a:xfrm>
           <a:prstGeom prst="rect">
@@ -8369,6 +8369,16 @@
 <file path=ppt/slides/slide9.xml><?xml version="1.0" encoding="utf-8"?>
 <p:sld xmlns:a="http://schemas.openxmlformats.org/drawingml/2006/main" xmlns:r="http://schemas.openxmlformats.org/officeDocument/2006/relationships" xmlns:p="http://schemas.openxmlformats.org/presentationml/2006/main">
   <p:cSld>
+    <p:bg>
+      <p:bgPr>
+        <a:solidFill>
+          <a:schemeClr val="bg1">
+            <a:lumMod val="75000"/>
+          </a:schemeClr>
+        </a:solidFill>
+        <a:effectLst/>
+      </p:bgPr>
+    </p:bg>
     <p:spTree>
       <p:nvGrpSpPr>
         <p:cNvPr id="1" name=""/>
@@ -8435,6 +8445,10 @@
           </a:bodyPr>
           <a:lstStyle/>
           <a:p>
+            <a:pPr>
+              <a:buFont typeface="+mj-lt"/>
+              <a:buAutoNum type="arabicPeriod"/>
+            </a:pPr>
             <a:r>
               <a:rPr lang="es-CO" sz="1800" dirty="0"/>
               <a:t>Por cada IPS pública hay más de 9 </a:t>
@@ -8449,34 +8463,54 @@
             </a:r>
           </a:p>
           <a:p>
+            <a:pPr>
+              <a:buFont typeface="+mj-lt"/>
+              <a:buAutoNum type="arabicPeriod"/>
+            </a:pPr>
             <a:r>
               <a:rPr lang="es-CO" sz="1800" dirty="0"/>
-              <a:t>La distribución de las IPS varía significativamente entre las regiones, en zonas apartadas de difícil acceso su número es significativamente menor</a:t>
-            </a:r>
-          </a:p>
-          <a:p>
+              <a:t>La distribución de las IPS varía diametralmente entre las regiones, en zonas apartadas de difícil acceso su número es significativamente menor</a:t>
+            </a:r>
+          </a:p>
+          <a:p>
+            <a:pPr>
+              <a:buFont typeface="+mj-lt"/>
+              <a:buAutoNum type="arabicPeriod"/>
+            </a:pPr>
             <a:r>
               <a:rPr lang="es-CO" sz="1800" dirty="0"/>
               <a:t>Vaupés y Vichada tienen menos de 1 IPS por cada 10.000 habitantes</a:t>
             </a:r>
           </a:p>
           <a:p>
+            <a:pPr>
+              <a:buFont typeface="+mj-lt"/>
+              <a:buAutoNum type="arabicPeriod"/>
+            </a:pPr>
             <a:r>
               <a:rPr lang="es-CO" sz="1800" dirty="0" err="1"/>
               <a:t>Vaupes</a:t>
             </a:r>
             <a:r>
               <a:rPr lang="es-CO" sz="1800" dirty="0"/>
-              <a:t>, Vichada, Amazonas, Guinea y Guaviare tienen menos de 1 IPS por cada 1000 metros cuadrados de superficie</a:t>
-            </a:r>
-          </a:p>
-          <a:p>
+              <a:t>, Vichada, Amazonas, Guainía y Guaviare tienen menos de 1 IPS por cada 1000 metros cuadrados de superficie</a:t>
+            </a:r>
+          </a:p>
+          <a:p>
+            <a:pPr>
+              <a:buFont typeface="+mj-lt"/>
+              <a:buAutoNum type="arabicPeriod"/>
+            </a:pPr>
             <a:r>
               <a:rPr lang="es-CO" sz="1800" dirty="0"/>
               <a:t>Aproximadamente el 60% de las IPS están concentradas en la región Caribe y del Centro Oriente </a:t>
             </a:r>
           </a:p>
           <a:p>
+            <a:pPr>
+              <a:buFont typeface="+mj-lt"/>
+              <a:buAutoNum type="arabicPeriod"/>
+            </a:pPr>
             <a:r>
               <a:rPr lang="es-CO" sz="1800" dirty="0"/>
               <a:t>Existe una correlación directa y estadísticamente significativa entre el número de </a:t>
@@ -8487,7 +8521,7 @@
             </a:r>
             <a:r>
               <a:rPr lang="es-CO" sz="1800" dirty="0"/>
-              <a:t> y los prestadores independientes en salud, por lo que la presencia de los primeros está asociada con la llegada de los segundos.</a:t>
+              <a:t> y los prestadores independientes en salud.</a:t>
             </a:r>
           </a:p>
           <a:p>

</xml_diff>